<commit_message>
Deploy hytechclub/cs-101 to github.com/hytechclub/cs-101.git:gh-pages
</commit_message>
<xml_diff>
--- a/Conditionals/ConditionalStatements.pptx
+++ b/Conditionals/ConditionalStatements.pptx
@@ -218,7 +218,7 @@
           <a:p>
             <a:fld id="{19104133-B5B0-4351-8158-4F0E5EB1E2BF}" type="datetimeFigureOut">
               <a:rPr lang="en-US" smtClean="0"/>
-              <a:t>2/17/2020</a:t>
+              <a:t>10/15/2020</a:t>
             </a:fld>
             <a:endParaRPr lang="en-US"/>
           </a:p>
@@ -972,7 +972,6 @@
               <a:rPr lang="en-US" b="0" i="0" baseline="0" dirty="0" smtClean="0"/>
               <a:t> statement just like a sentence in English. They are fairly literal.</a:t>
             </a:r>
-            <a:endParaRPr lang="en-US" b="0" i="0" baseline="0" dirty="0" smtClean="0"/>
           </a:p>
         </p:txBody>
       </p:sp>
@@ -1184,7 +1183,6 @@
               <a:rPr lang="en-US" b="1" i="0" baseline="0" dirty="0" smtClean="0"/>
               <a:t>true</a:t>
             </a:r>
-            <a:endParaRPr lang="en-US" b="1" i="0" baseline="0" dirty="0" smtClean="0"/>
           </a:p>
         </p:txBody>
       </p:sp>
@@ -1746,7 +1744,6 @@
               <a:rPr lang="en-US" b="1" i="0" baseline="0" dirty="0" smtClean="0"/>
               <a:t> expression for the else clause.</a:t>
             </a:r>
-            <a:endParaRPr lang="en-US" b="1" i="0" baseline="0" dirty="0" smtClean="0"/>
           </a:p>
         </p:txBody>
       </p:sp>
@@ -2249,7 +2246,7 @@
             <a:fld id="{1C2D31DE-C454-491C-B5C3-F097855E3DF7}" type="datetime4">
               <a:rPr lang="en-US" smtClean="0"/>
               <a:pPr/>
-              <a:t>February 17, 2020</a:t>
+              <a:t>October 15, 2020</a:t>
             </a:fld>
             <a:endParaRPr lang="en-US" dirty="0"/>
           </a:p>
@@ -5649,7 +5646,7 @@
           <a:p>
             <a:fld id="{5958763E-B898-436D-883D-03711491D54A}" type="datetimeFigureOut">
               <a:rPr lang="en-US" smtClean="0"/>
-              <a:t>2/17/2020</a:t>
+              <a:t>10/15/2020</a:t>
             </a:fld>
             <a:endParaRPr lang="en-US"/>
           </a:p>
@@ -5850,7 +5847,7 @@
           <a:p>
             <a:fld id="{5958763E-B898-436D-883D-03711491D54A}" type="datetimeFigureOut">
               <a:rPr lang="en-US" smtClean="0"/>
-              <a:t>2/17/2020</a:t>
+              <a:t>10/15/2020</a:t>
             </a:fld>
             <a:endParaRPr lang="en-US"/>
           </a:p>
@@ -6107,7 +6104,7 @@
           <a:p>
             <a:fld id="{5958763E-B898-436D-883D-03711491D54A}" type="datetimeFigureOut">
               <a:rPr lang="en-US" smtClean="0"/>
-              <a:t>2/17/2020</a:t>
+              <a:t>10/15/2020</a:t>
             </a:fld>
             <a:endParaRPr lang="en-US"/>
           </a:p>
@@ -6462,7 +6459,7 @@
           <a:p>
             <a:fld id="{5958763E-B898-436D-883D-03711491D54A}" type="datetimeFigureOut">
               <a:rPr lang="en-US" smtClean="0"/>
-              <a:t>2/17/2020</a:t>
+              <a:t>10/15/2020</a:t>
             </a:fld>
             <a:endParaRPr lang="en-US"/>
           </a:p>
@@ -6885,7 +6882,7 @@
           <a:p>
             <a:fld id="{5958763E-B898-436D-883D-03711491D54A}" type="datetimeFigureOut">
               <a:rPr lang="en-US" smtClean="0"/>
-              <a:t>2/17/2020</a:t>
+              <a:t>10/15/2020</a:t>
             </a:fld>
             <a:endParaRPr lang="en-US"/>
           </a:p>
@@ -7393,7 +7390,7 @@
           <a:p>
             <a:fld id="{5958763E-B898-436D-883D-03711491D54A}" type="datetimeFigureOut">
               <a:rPr lang="en-US" smtClean="0"/>
-              <a:t>2/17/2020</a:t>
+              <a:t>10/15/2020</a:t>
             </a:fld>
             <a:endParaRPr lang="en-US"/>
           </a:p>
@@ -7851,7 +7848,7 @@
           <a:p>
             <a:fld id="{5958763E-B898-436D-883D-03711491D54A}" type="datetimeFigureOut">
               <a:rPr lang="en-US" smtClean="0"/>
-              <a:t>2/17/2020</a:t>
+              <a:t>10/15/2020</a:t>
             </a:fld>
             <a:endParaRPr lang="en-US"/>
           </a:p>
@@ -8469,7 +8466,7 @@
           <a:p>
             <a:fld id="{5958763E-B898-436D-883D-03711491D54A}" type="datetimeFigureOut">
               <a:rPr lang="en-US" smtClean="0"/>
-              <a:t>2/17/2020</a:t>
+              <a:t>10/15/2020</a:t>
             </a:fld>
             <a:endParaRPr lang="en-US"/>
           </a:p>
@@ -9247,7 +9244,7 @@
           <a:p>
             <a:fld id="{5958763E-B898-436D-883D-03711491D54A}" type="datetimeFigureOut">
               <a:rPr lang="en-US" smtClean="0"/>
-              <a:t>2/17/2020</a:t>
+              <a:t>10/15/2020</a:t>
             </a:fld>
             <a:endParaRPr lang="en-US"/>
           </a:p>
@@ -9358,7 +9355,7 @@
           <a:p>
             <a:fld id="{5958763E-B898-436D-883D-03711491D54A}" type="datetimeFigureOut">
               <a:rPr lang="en-US" smtClean="0"/>
-              <a:t>2/17/2020</a:t>
+              <a:t>10/15/2020</a:t>
             </a:fld>
             <a:endParaRPr lang="en-US"/>
           </a:p>
@@ -9700,7 +9697,7 @@
             <a:fld id="{1C2D31DE-C454-491C-B5C3-F097855E3DF7}" type="datetime4">
               <a:rPr lang="en-US" smtClean="0"/>
               <a:pPr/>
-              <a:t>February 17, 2020</a:t>
+              <a:t>October 15, 2020</a:t>
             </a:fld>
             <a:endParaRPr lang="en-US" dirty="0"/>
           </a:p>
@@ -12860,7 +12857,7 @@
           <a:p>
             <a:fld id="{5958763E-B898-436D-883D-03711491D54A}" type="datetimeFigureOut">
               <a:rPr lang="en-US" smtClean="0"/>
-              <a:t>2/17/2020</a:t>
+              <a:t>10/15/2020</a:t>
             </a:fld>
             <a:endParaRPr lang="en-US"/>
           </a:p>
@@ -12991,7 +12988,7 @@
           <a:p>
             <a:fld id="{5958763E-B898-436D-883D-03711491D54A}" type="datetimeFigureOut">
               <a:rPr lang="en-US" smtClean="0"/>
-              <a:t>2/17/2020</a:t>
+              <a:t>10/15/2020</a:t>
             </a:fld>
             <a:endParaRPr lang="en-US"/>
           </a:p>
@@ -13122,7 +13119,7 @@
           <a:p>
             <a:fld id="{5958763E-B898-436D-883D-03711491D54A}" type="datetimeFigureOut">
               <a:rPr lang="en-US" smtClean="0"/>
-              <a:t>2/17/2020</a:t>
+              <a:t>10/15/2020</a:t>
             </a:fld>
             <a:endParaRPr lang="en-US"/>
           </a:p>
@@ -13253,7 +13250,7 @@
           <a:p>
             <a:fld id="{5958763E-B898-436D-883D-03711491D54A}" type="datetimeFigureOut">
               <a:rPr lang="en-US" smtClean="0"/>
-              <a:t>2/17/2020</a:t>
+              <a:t>10/15/2020</a:t>
             </a:fld>
             <a:endParaRPr lang="en-US"/>
           </a:p>
@@ -13384,7 +13381,7 @@
           <a:p>
             <a:fld id="{5958763E-B898-436D-883D-03711491D54A}" type="datetimeFigureOut">
               <a:rPr lang="en-US" smtClean="0"/>
-              <a:t>2/17/2020</a:t>
+              <a:t>10/15/2020</a:t>
             </a:fld>
             <a:endParaRPr lang="en-US"/>
           </a:p>
@@ -13515,7 +13512,7 @@
           <a:p>
             <a:fld id="{5958763E-B898-436D-883D-03711491D54A}" type="datetimeFigureOut">
               <a:rPr lang="en-US" smtClean="0"/>
-              <a:t>2/17/2020</a:t>
+              <a:t>10/15/2020</a:t>
             </a:fld>
             <a:endParaRPr lang="en-US"/>
           </a:p>
@@ -13646,7 +13643,7 @@
           <a:p>
             <a:fld id="{5958763E-B898-436D-883D-03711491D54A}" type="datetimeFigureOut">
               <a:rPr lang="en-US" smtClean="0"/>
-              <a:t>2/17/2020</a:t>
+              <a:t>10/15/2020</a:t>
             </a:fld>
             <a:endParaRPr lang="en-US"/>
           </a:p>
@@ -13777,7 +13774,7 @@
           <a:p>
             <a:fld id="{5958763E-B898-436D-883D-03711491D54A}" type="datetimeFigureOut">
               <a:rPr lang="en-US" smtClean="0"/>
-              <a:t>2/17/2020</a:t>
+              <a:t>10/15/2020</a:t>
             </a:fld>
             <a:endParaRPr lang="en-US"/>
           </a:p>
@@ -13917,7 +13914,7 @@
           <a:p>
             <a:fld id="{5958763E-B898-436D-883D-03711491D54A}" type="datetimeFigureOut">
               <a:rPr lang="en-US" smtClean="0"/>
-              <a:t>2/17/2020</a:t>
+              <a:t>10/15/2020</a:t>
             </a:fld>
             <a:endParaRPr lang="en-US"/>
           </a:p>
@@ -17278,7 +17275,7 @@
             <a:fld id="{1C2D31DE-C454-491C-B5C3-F097855E3DF7}" type="datetime4">
               <a:rPr lang="en-US" smtClean="0"/>
               <a:pPr/>
-              <a:t>February 17, 2020</a:t>
+              <a:t>October 15, 2020</a:t>
             </a:fld>
             <a:endParaRPr lang="en-US" dirty="0"/>
           </a:p>
@@ -29523,7 +29520,7 @@
           <a:p>
             <a:fld id="{5958763E-B898-436D-883D-03711491D54A}" type="datetimeFigureOut">
               <a:rPr lang="en-US" smtClean="0"/>
-              <a:t>2/17/2020</a:t>
+              <a:t>10/15/2020</a:t>
             </a:fld>
             <a:endParaRPr lang="en-US"/>
           </a:p>
@@ -29932,7 +29929,7 @@
           <a:p>
             <a:fld id="{5958763E-B898-436D-883D-03711491D54A}" type="datetimeFigureOut">
               <a:rPr lang="en-US" smtClean="0"/>
-              <a:t>2/17/2020</a:t>
+              <a:t>10/15/2020</a:t>
             </a:fld>
             <a:endParaRPr lang="en-US"/>
           </a:p>
@@ -30233,7 +30230,7 @@
           <a:p>
             <a:fld id="{5958763E-B898-436D-883D-03711491D54A}" type="datetimeFigureOut">
               <a:rPr lang="en-US" smtClean="0"/>
-              <a:t>2/17/2020</a:t>
+              <a:t>10/15/2020</a:t>
             </a:fld>
             <a:endParaRPr lang="en-US"/>
           </a:p>
@@ -30441,7 +30438,7 @@
           <a:p>
             <a:fld id="{5958763E-B898-436D-883D-03711491D54A}" type="datetimeFigureOut">
               <a:rPr lang="en-US" smtClean="0"/>
-              <a:t>2/17/2020</a:t>
+              <a:t>10/15/2020</a:t>
             </a:fld>
             <a:endParaRPr lang="en-US"/>
           </a:p>
@@ -30709,7 +30706,7 @@
           <a:p>
             <a:fld id="{5958763E-B898-436D-883D-03711491D54A}" type="datetimeFigureOut">
               <a:rPr lang="en-US" smtClean="0"/>
-              <a:t>2/17/2020</a:t>
+              <a:t>10/15/2020</a:t>
             </a:fld>
             <a:endParaRPr lang="en-US"/>
           </a:p>
@@ -31226,7 +31223,7 @@
           <a:p>
             <a:fld id="{5958763E-B898-436D-883D-03711491D54A}" type="datetimeFigureOut">
               <a:rPr lang="en-US" smtClean="0"/>
-              <a:t>2/17/2020</a:t>
+              <a:t>10/15/2020</a:t>
             </a:fld>
             <a:endParaRPr lang="en-US"/>
           </a:p>
@@ -31714,7 +31711,7 @@
           <a:p>
             <a:fld id="{5958763E-B898-436D-883D-03711491D54A}" type="datetimeFigureOut">
               <a:rPr lang="en-US" smtClean="0"/>
-              <a:t>2/17/2020</a:t>
+              <a:t>10/15/2020</a:t>
             </a:fld>
             <a:endParaRPr lang="en-US"/>
           </a:p>
@@ -32540,7 +32537,7 @@
           <a:p>
             <a:fld id="{5958763E-B898-436D-883D-03711491D54A}" type="datetimeFigureOut">
               <a:rPr lang="en-US" smtClean="0"/>
-              <a:t>2/17/2020</a:t>
+              <a:t>10/15/2020</a:t>
             </a:fld>
             <a:endParaRPr lang="en-US"/>
           </a:p>
@@ -32748,7 +32745,7 @@
           <a:p>
             <a:fld id="{5958763E-B898-436D-883D-03711491D54A}" type="datetimeFigureOut">
               <a:rPr lang="en-US" smtClean="0"/>
-              <a:t>2/17/2020</a:t>
+              <a:t>10/15/2020</a:t>
             </a:fld>
             <a:endParaRPr lang="en-US"/>
           </a:p>
@@ -33090,7 +33087,7 @@
           <a:p>
             <a:fld id="{5958763E-B898-436D-883D-03711491D54A}" type="datetimeFigureOut">
               <a:rPr lang="en-US" smtClean="0"/>
-              <a:t>2/17/2020</a:t>
+              <a:t>10/15/2020</a:t>
             </a:fld>
             <a:endParaRPr lang="en-US"/>
           </a:p>
@@ -33327,7 +33324,7 @@
           <a:p>
             <a:fld id="{5958763E-B898-436D-883D-03711491D54A}" type="datetimeFigureOut">
               <a:rPr lang="en-US" smtClean="0"/>
-              <a:t>2/17/2020</a:t>
+              <a:t>10/15/2020</a:t>
             </a:fld>
             <a:endParaRPr lang="en-US"/>
           </a:p>
@@ -33578,7 +33575,7 @@
           <a:p>
             <a:fld id="{5958763E-B898-436D-883D-03711491D54A}" type="datetimeFigureOut">
               <a:rPr lang="en-US" smtClean="0"/>
-              <a:t>2/17/2020</a:t>
+              <a:t>10/15/2020</a:t>
             </a:fld>
             <a:endParaRPr lang="en-US"/>
           </a:p>
@@ -38284,11 +38281,7 @@
             </a:r>
             <a:r>
               <a:rPr lang="en-US" sz="6000" dirty="0" smtClean="0"/>
-              <a:t> </a:t>
-            </a:r>
-            <a:r>
-              <a:rPr lang="en-US" sz="6000" dirty="0" smtClean="0"/>
-              <a:t>is a form of data that can be </a:t>
+              <a:t> is a form of data that can be </a:t>
             </a:r>
             <a:r>
               <a:rPr lang="en-US" sz="6000" i="1" dirty="0" smtClean="0"/>
@@ -38555,22 +38548,12 @@
                 </a:solidFill>
                 <a:latin typeface="Consolas" panose="020B0609020204030204" pitchFamily="49" charset="0"/>
               </a:rPr>
-              <a:t>i</a:t>
-            </a:r>
-            <a:r>
-              <a:rPr lang="en-US" sz="4000" cap="none" dirty="0" smtClean="0">
-                <a:solidFill>
-                  <a:srgbClr val="0000FF"/>
-                </a:solidFill>
-                <a:latin typeface="Consolas" panose="020B0609020204030204" pitchFamily="49" charset="0"/>
-              </a:rPr>
-              <a:t>f</a:t>
+              <a:t>if</a:t>
             </a:r>
             <a:r>
               <a:rPr lang="en-US" sz="4000" dirty="0"/>
               <a:t> Statements</a:t>
             </a:r>
-            <a:endParaRPr lang="en-US" sz="4000" dirty="0"/>
           </a:p>
         </p:txBody>
       </p:sp>
@@ -38998,16 +38981,7 @@
                 </a:solidFill>
                 <a:latin typeface="Consolas" panose="020B0609020204030204" pitchFamily="49" charset="0"/>
               </a:rPr>
-              <a:t>i</a:t>
-            </a:r>
-            <a:r>
-              <a:rPr lang="en-US" sz="4000" cap="none" dirty="0" smtClean="0">
-                <a:solidFill>
-                  <a:srgbClr val="0000FF"/>
-                </a:solidFill>
-                <a:latin typeface="Consolas" panose="020B0609020204030204" pitchFamily="49" charset="0"/>
-              </a:rPr>
-              <a:t>f</a:t>
+              <a:t>if</a:t>
             </a:r>
             <a:r>
               <a:rPr lang="en-US" sz="4000" dirty="0"/>
@@ -39470,15 +39444,6 @@
               </a:rPr>
               <a:t> statements like English sentences!</a:t>
             </a:r>
-            <a:endParaRPr lang="en-US" sz="2400" dirty="0" smtClean="0">
-              <a:solidFill>
-                <a:schemeClr val="accent2">
-                  <a:lumMod val="50000"/>
-                </a:schemeClr>
-              </a:solidFill>
-              <a:ea typeface="Segoe UI" pitchFamily="34" charset="0"/>
-              <a:cs typeface="Segoe UI" pitchFamily="34" charset="0"/>
-            </a:endParaRPr>
           </a:p>
         </p:txBody>
       </p:sp>
@@ -40420,8 +40385,12 @@
           <a:lstStyle/>
           <a:p>
             <a:r>
+              <a:rPr lang="en-US" smtClean="0"/>
+              <a:t>Comparison </a:t>
+            </a:r>
+            <a:r>
               <a:rPr lang="en-US" dirty="0" smtClean="0"/>
-              <a:t>Boolean Operators</a:t>
+              <a:t>Operators</a:t>
             </a:r>
             <a:endParaRPr lang="en-US" dirty="0"/>
           </a:p>
@@ -41573,19 +41542,6 @@
               </a:rPr>
               <a:t>!</a:t>
             </a:r>
-            <a:endParaRPr lang="en-US" sz="2400" dirty="0" smtClean="0">
-              <a:gradFill>
-                <a:gsLst>
-                  <a:gs pos="2917">
-                    <a:schemeClr val="tx1"/>
-                  </a:gs>
-                  <a:gs pos="30000">
-                    <a:schemeClr val="tx1"/>
-                  </a:gs>
-                </a:gsLst>
-                <a:lin ang="5400000" scaled="0"/>
-              </a:gradFill>
-            </a:endParaRPr>
           </a:p>
         </p:txBody>
       </p:sp>

</xml_diff>